<commit_message>
fix: slide Bao cao buoi 1
</commit_message>
<xml_diff>
--- a/Slide/Bao cao buoi 1.pptx
+++ b/Slide/Bao cao buoi 1.pptx
@@ -5090,7 +5090,7 @@
               <a:t> </a:t>
             </a:r>
             <a:r>
-              <a:rPr lang="en-US" sz="5000" dirty="0" err="1" smtClean="0">
+              <a:rPr lang="en-US" sz="5000" dirty="0" err="1">
                 <a:solidFill>
                   <a:srgbClr val="0000CC"/>
                 </a:solidFill>
@@ -5098,18 +5098,13 @@
               <a:t>án</a:t>
             </a:r>
             <a:r>
-              <a:rPr lang="en-US" sz="5000" smtClean="0">
+              <a:rPr lang="en-US" sz="5000" dirty="0">
                 <a:solidFill>
                   <a:srgbClr val="0000CC"/>
                 </a:solidFill>
               </a:rPr>
-              <a:t>   : </a:t>
-            </a:r>
-            <a:endParaRPr lang="en-US" sz="5000" dirty="0">
-              <a:solidFill>
-                <a:srgbClr val="0000CC"/>
-              </a:solidFill>
-            </a:endParaRPr>
+              <a:t>: </a:t>
+            </a:r>
           </a:p>
           <a:p>
             <a:endParaRPr lang="en-US" sz="2800" dirty="0">

</xml_diff>